<commit_message>
week1-6 reviewed for latex errors and fixed. week-6 completed untill interview problems.
</commit_message>
<xml_diff>
--- a/docs/week-1/ce100-week-1-intro.md_word.pptx
+++ b/docs/week-1/ce100-week-1-intro.md_word.pptx
@@ -3580,199 +3580,230 @@
                       <m:jc m:val="center"/>
                     </m:oMathParaPr>
                     <m:oMath>
-                      <m:r>
-                        <m:t>Ω</m:t>
-                      </m:r>
-                      <m:d>
-                        <m:dPr>
-                          <m:begChr m:val="("/>
-                          <m:endChr m:val=")"/>
-                          <m:sepChr m:val=""/>
-                          <m:grow/>
-                        </m:dPr>
-                        <m:e>
-                          <m:r>
-                            <m:t>g</m:t>
-                          </m:r>
-                          <m:d>
-                            <m:dPr>
-                              <m:begChr m:val="("/>
-                              <m:endChr m:val=")"/>
-                              <m:sepChr m:val=""/>
-                              <m:grow/>
-                            </m:dPr>
-                            <m:e>
-                              <m:r>
-                                <m:t>n</m:t>
-                              </m:r>
-                            </m:e>
-                          </m:d>
-                        </m:e>
-                      </m:d>
-                      <m:r>
-                        <m:rPr>
-                          <m:sty m:val="p"/>
-                        </m:rPr>
-                        <m:t>=</m:t>
-                      </m:r>
-                      <m:r>
-                        <m:rPr>
-                          <m:sty m:val="p"/>
-                        </m:rPr>
-                        <m:t>{</m:t>
-                      </m:r>
-                      <m:r>
-                        <m:t>f</m:t>
-                      </m:r>
-                      <m:d>
-                        <m:dPr>
-                          <m:begChr m:val="("/>
-                          <m:endChr m:val=")"/>
-                          <m:sepChr m:val=""/>
-                          <m:grow/>
-                        </m:dPr>
-                        <m:e>
-                          <m:r>
-                            <m:t>n</m:t>
-                          </m:r>
-                        </m:e>
-                      </m:d>
-                      <m:r>
-                        <m:rPr>
-                          <m:sty m:val="p"/>
-                        </m:rPr>
-                        <m:t>:</m:t>
-                      </m:r>
-                      <m:r>
-                        <m:rPr>
-                          <m:sty m:val="p"/>
-                        </m:rPr>
-                        <m:t>∃</m:t>
-                      </m:r>
-                      <m:r>
-                        <m:rPr>
-                          <m:nor/>
-                          <m:sty m:val="p"/>
-                        </m:rPr>
-                        <m:t> positive constants </m:t>
-                      </m:r>
-                      <m:r>
-                        <m:t>c</m:t>
-                      </m:r>
-                      <m:r>
-                        <m:rPr>
-                          <m:sty m:val="p"/>
-                        </m:rPr>
-                        <m:t>,</m:t>
-                      </m:r>
-                      <m:sSub>
-                        <m:e>
-                          <m:r>
-                            <m:t>n</m:t>
-                          </m:r>
-                        </m:e>
-                        <m:sub>
-                          <m:r>
-                            <m:t>0</m:t>
-                          </m:r>
-                        </m:sub>
-                      </m:sSub>
-                      <m:r>
-                        <m:rPr>
-                          <m:nor/>
-                          <m:sty m:val="p"/>
-                        </m:rPr>
-                        <m:t> such that </m:t>
-                      </m:r>
-                      <m:r>
-                        <m:t>0</m:t>
-                      </m:r>
-                      <m:r>
-                        <m:rPr>
-                          <m:sty m:val="p"/>
-                        </m:rPr>
-                        <m:t>≤</m:t>
-                      </m:r>
-                      <m:r>
-                        <m:t>c</m:t>
-                      </m:r>
-                      <m:r>
-                        <m:t>g</m:t>
-                      </m:r>
-                      <m:d>
-                        <m:dPr>
-                          <m:begChr m:val="("/>
-                          <m:endChr m:val=")"/>
-                          <m:sepChr m:val=""/>
-                          <m:grow/>
-                        </m:dPr>
-                        <m:e>
-                          <m:r>
-                            <m:t>n</m:t>
-                          </m:r>
-                        </m:e>
-                      </m:d>
-                      <m:r>
-                        <m:rPr>
-                          <m:sty m:val="p"/>
-                        </m:rPr>
-                        <m:t>≤</m:t>
-                      </m:r>
-                      <m:r>
-                        <m:t>f</m:t>
-                      </m:r>
-                      <m:d>
-                        <m:dPr>
-                          <m:begChr m:val="("/>
-                          <m:endChr m:val=")"/>
-                          <m:sepChr m:val=""/>
-                          <m:grow/>
-                        </m:dPr>
-                        <m:e>
-                          <m:r>
-                            <m:t>n</m:t>
-                          </m:r>
-                        </m:e>
-                      </m:d>
-                      <m:r>
-                        <m:rPr>
-                          <m:sty m:val="p"/>
-                        </m:rPr>
-                        <m:t>,</m:t>
-                      </m:r>
-                      <m:r>
-                        <m:rPr>
-                          <m:sty m:val="p"/>
-                        </m:rPr>
-                        <m:t>∀</m:t>
-                      </m:r>
-                      <m:r>
-                        <m:t>n</m:t>
-                      </m:r>
-                      <m:r>
-                        <m:rPr>
-                          <m:sty m:val="p"/>
-                        </m:rPr>
-                        <m:t>≥</m:t>
-                      </m:r>
-                      <m:sSub>
-                        <m:e>
-                          <m:r>
-                            <m:t>n</m:t>
-                          </m:r>
-                        </m:e>
-                        <m:sub>
-                          <m:r>
-                            <m:t>0</m:t>
-                          </m:r>
-                        </m:sub>
-                      </m:sSub>
-                      <m:r>
-                        <m:rPr>
-                          <m:sty m:val="p"/>
-                        </m:rPr>
-                        <m:t>}</m:t>
-                      </m:r>
+                      <m:m>
+                        <m:mPr>
+                          <m:baseJc m:val="center"/>
+                          <m:plcHide m:val="1"/>
+                          <m:mcs>
+                            <m:mc>
+                              <m:mcPr>
+                                <m:mcJc m:val="right"/>
+                                <m:count m:val="1"/>
+                              </m:mcPr>
+                            </m:mc>
+                            <m:mc>
+                              <m:mcPr>
+                                <m:mcJc m:val="left"/>
+                                <m:count m:val="1"/>
+                              </m:mcPr>
+                            </m:mc>
+                          </m:mcs>
+                        </m:mPr>
+                        <m:mr>
+                          <m:e>
+                            <m:r>
+                              <m:t>Ω</m:t>
+                            </m:r>
+                            <m:d>
+                              <m:dPr>
+                                <m:begChr m:val="("/>
+                                <m:endChr m:val=")"/>
+                                <m:sepChr m:val=""/>
+                                <m:grow/>
+                              </m:dPr>
+                              <m:e>
+                                <m:r>
+                                  <m:t>g</m:t>
+                                </m:r>
+                                <m:d>
+                                  <m:dPr>
+                                    <m:begChr m:val="("/>
+                                    <m:endChr m:val=")"/>
+                                    <m:sepChr m:val=""/>
+                                    <m:grow/>
+                                  </m:dPr>
+                                  <m:e>
+                                    <m:r>
+                                      <m:t>n</m:t>
+                                    </m:r>
+                                  </m:e>
+                                </m:d>
+                              </m:e>
+                            </m:d>
+                          </m:e>
+                          <m:e>
+                            <m:r>
+                              <m:rPr>
+                                <m:sty m:val="p"/>
+                              </m:rPr>
+                              <m:t>=</m:t>
+                            </m:r>
+                            <m:r>
+                              <m:rPr>
+                                <m:sty m:val="p"/>
+                              </m:rPr>
+                              <m:t>{</m:t>
+                            </m:r>
+                            <m:r>
+                              <m:t>f</m:t>
+                            </m:r>
+                            <m:d>
+                              <m:dPr>
+                                <m:begChr m:val="("/>
+                                <m:endChr m:val=")"/>
+                                <m:sepChr m:val=""/>
+                                <m:grow/>
+                              </m:dPr>
+                              <m:e>
+                                <m:r>
+                                  <m:t>n</m:t>
+                                </m:r>
+                              </m:e>
+                            </m:d>
+                            <m:r>
+                              <m:rPr>
+                                <m:sty m:val="p"/>
+                              </m:rPr>
+                              <m:t>:</m:t>
+                            </m:r>
+                            <m:r>
+                              <m:rPr>
+                                <m:sty m:val="p"/>
+                              </m:rPr>
+                              <m:t>∃</m:t>
+                            </m:r>
+                            <m:r>
+                              <m:rPr>
+                                <m:nor/>
+                                <m:sty m:val="p"/>
+                              </m:rPr>
+                              <m:t> positive constants </m:t>
+                            </m:r>
+                            <m:r>
+                              <m:t>c</m:t>
+                            </m:r>
+                            <m:r>
+                              <m:rPr>
+                                <m:sty m:val="p"/>
+                              </m:rPr>
+                              <m:t>,</m:t>
+                            </m:r>
+                            <m:sSub>
+                              <m:e>
+                                <m:r>
+                                  <m:t>n</m:t>
+                                </m:r>
+                              </m:e>
+                              <m:sub>
+                                <m:r>
+                                  <m:t>0</m:t>
+                                </m:r>
+                              </m:sub>
+                            </m:sSub>
+                            <m:r>
+                              <m:rPr>
+                                <m:nor/>
+                                <m:sty m:val="p"/>
+                              </m:rPr>
+                              <m:t> such that </m:t>
+                            </m:r>
+                          </m:e>
+                        </m:mr>
+                        <m:mr>
+                          <m:e/>
+                          <m:e>
+                            <m:r>
+                              <m:t>0</m:t>
+                            </m:r>
+                            <m:r>
+                              <m:rPr>
+                                <m:sty m:val="p"/>
+                              </m:rPr>
+                              <m:t>≤</m:t>
+                            </m:r>
+                            <m:r>
+                              <m:t>c</m:t>
+                            </m:r>
+                            <m:r>
+                              <m:t>g</m:t>
+                            </m:r>
+                            <m:d>
+                              <m:dPr>
+                                <m:begChr m:val="("/>
+                                <m:endChr m:val=")"/>
+                                <m:sepChr m:val=""/>
+                                <m:grow/>
+                              </m:dPr>
+                              <m:e>
+                                <m:r>
+                                  <m:t>n</m:t>
+                                </m:r>
+                              </m:e>
+                            </m:d>
+                            <m:r>
+                              <m:rPr>
+                                <m:sty m:val="p"/>
+                              </m:rPr>
+                              <m:t>≤</m:t>
+                            </m:r>
+                            <m:r>
+                              <m:t>f</m:t>
+                            </m:r>
+                            <m:d>
+                              <m:dPr>
+                                <m:begChr m:val="("/>
+                                <m:endChr m:val=")"/>
+                                <m:sepChr m:val=""/>
+                                <m:grow/>
+                              </m:dPr>
+                              <m:e>
+                                <m:r>
+                                  <m:t>n</m:t>
+                                </m:r>
+                              </m:e>
+                            </m:d>
+                            <m:r>
+                              <m:rPr>
+                                <m:sty m:val="p"/>
+                              </m:rPr>
+                              <m:t>,</m:t>
+                            </m:r>
+                            <m:r>
+                              <m:rPr>
+                                <m:sty m:val="p"/>
+                              </m:rPr>
+                              <m:t>∀</m:t>
+                            </m:r>
+                            <m:r>
+                              <m:t>n</m:t>
+                            </m:r>
+                            <m:r>
+                              <m:rPr>
+                                <m:sty m:val="p"/>
+                              </m:rPr>
+                              <m:t>≥</m:t>
+                            </m:r>
+                            <m:sSub>
+                              <m:e>
+                                <m:r>
+                                  <m:t>n</m:t>
+                                </m:r>
+                              </m:e>
+                              <m:sub>
+                                <m:r>
+                                  <m:t>0</m:t>
+                                </m:r>
+                              </m:sub>
+                            </m:sSub>
+                            <m:r>
+                              <m:rPr>
+                                <m:sty m:val="p"/>
+                              </m:rPr>
+                              <m:t>}</m:t>
+                            </m:r>
+                          </m:e>
+                        </m:mr>
+                      </m:m>
                     </m:oMath>
                   </m:oMathPara>
                 </a14:m>
@@ -5191,263 +5222,307 @@
                   <a:buNone/>
                 </a:pPr>
                 <a14:m>
-                  <m:oMath xmlns:m="http://schemas.openxmlformats.org/officeDocument/2006/math">
-                    <m:r>
-                      <m:t>f</m:t>
-                    </m:r>
-                    <m:d>
-                      <m:dPr>
-                        <m:begChr m:val="("/>
-                        <m:endChr m:val=")"/>
-                        <m:sepChr m:val=""/>
-                        <m:grow/>
-                      </m:dPr>
-                      <m:e>
-                        <m:r>
-                          <m:t>n</m:t>
-                        </m:r>
-                      </m:e>
-                    </m:d>
-                    <m:r>
-                      <m:rPr>
-                        <m:sty m:val="p"/>
-                      </m:rPr>
-                      <m:t>=</m:t>
-                    </m:r>
-                    <m:r>
-                      <m:t>Θ</m:t>
-                    </m:r>
-                    <m:d>
-                      <m:dPr>
-                        <m:begChr m:val="("/>
-                        <m:endChr m:val=")"/>
-                        <m:sepChr m:val=""/>
-                        <m:grow/>
-                      </m:dPr>
-                      <m:e>
-                        <m:r>
-                          <m:t>g</m:t>
-                        </m:r>
-                        <m:d>
-                          <m:dPr>
-                            <m:begChr m:val="("/>
-                            <m:endChr m:val=")"/>
-                            <m:sepChr m:val=""/>
-                            <m:grow/>
-                          </m:dPr>
+                  <m:oMathPara xmlns:m="http://schemas.openxmlformats.org/officeDocument/2006/math">
+                    <m:oMathParaPr>
+                      <m:jc m:val="center"/>
+                    </m:oMathParaPr>
+                    <m:oMath>
+                      <m:m>
+                        <m:mPr>
+                          <m:baseJc m:val="center"/>
+                          <m:plcHide m:val="1"/>
+                          <m:mcs>
+                            <m:mc>
+                              <m:mcPr>
+                                <m:mcJc m:val="right"/>
+                                <m:count m:val="1"/>
+                              </m:mcPr>
+                            </m:mc>
+                            <m:mc>
+                              <m:mcPr>
+                                <m:mcJc m:val="left"/>
+                                <m:count m:val="1"/>
+                              </m:mcPr>
+                            </m:mc>
+                          </m:mcs>
+                        </m:mPr>
+                        <m:mr>
                           <m:e>
                             <m:r>
+                              <m:t>f</m:t>
+                            </m:r>
+                            <m:d>
+                              <m:dPr>
+                                <m:begChr m:val="("/>
+                                <m:endChr m:val=")"/>
+                                <m:sepChr m:val=""/>
+                                <m:grow/>
+                              </m:dPr>
+                              <m:e>
+                                <m:r>
+                                  <m:t>n</m:t>
+                                </m:r>
+                              </m:e>
+                            </m:d>
+                          </m:e>
+                          <m:e>
+                            <m:r>
+                              <m:rPr>
+                                <m:sty m:val="p"/>
+                              </m:rPr>
+                              <m:t>=</m:t>
+                            </m:r>
+                            <m:r>
+                              <m:t>Θ</m:t>
+                            </m:r>
+                            <m:d>
+                              <m:dPr>
+                                <m:begChr m:val="("/>
+                                <m:endChr m:val=")"/>
+                                <m:sepChr m:val=""/>
+                                <m:grow/>
+                              </m:dPr>
+                              <m:e>
+                                <m:r>
+                                  <m:t>g</m:t>
+                                </m:r>
+                                <m:d>
+                                  <m:dPr>
+                                    <m:begChr m:val="("/>
+                                    <m:endChr m:val=")"/>
+                                    <m:sepChr m:val=""/>
+                                    <m:grow/>
+                                  </m:dPr>
+                                  <m:e>
+                                    <m:r>
+                                      <m:t>n</m:t>
+                                    </m:r>
+                                  </m:e>
+                                </m:d>
+                              </m:e>
+                            </m:d>
+                            <m:r>
+                              <m:t> </m:t>
+                            </m:r>
+                            <m:r>
+                              <m:t>i</m:t>
+                            </m:r>
+                            <m:r>
+                              <m:t>f</m:t>
+                            </m:r>
+                            <m:r>
+                              <m:t> </m:t>
+                            </m:r>
+                            <m:r>
+                              <m:rPr>
+                                <m:sty m:val="p"/>
+                              </m:rPr>
+                              <m:t>∃</m:t>
+                            </m:r>
+                            <m:r>
+                              <m:t> </m:t>
+                            </m:r>
+                            <m:r>
+                              <m:rPr>
+                                <m:nor/>
+                                <m:sty m:val="p"/>
+                              </m:rPr>
+                              <m:t>positive constants</m:t>
+                            </m:r>
+                            <m:r>
+                              <m:t> </m:t>
+                            </m:r>
+                            <m:sSub>
+                              <m:e>
+                                <m:r>
+                                  <m:t>c</m:t>
+                                </m:r>
+                              </m:e>
+                              <m:sub>
+                                <m:r>
+                                  <m:t>1</m:t>
+                                </m:r>
+                              </m:sub>
+                            </m:sSub>
+                            <m:r>
+                              <m:rPr>
+                                <m:sty m:val="p"/>
+                              </m:rPr>
+                              <m:t>,</m:t>
+                            </m:r>
+                            <m:sSub>
+                              <m:e>
+                                <m:r>
+                                  <m:t>c</m:t>
+                                </m:r>
+                              </m:e>
+                              <m:sub>
+                                <m:r>
+                                  <m:t>2</m:t>
+                                </m:r>
+                              </m:sub>
+                            </m:sSub>
+                            <m:r>
+                              <m:rPr>
+                                <m:sty m:val="p"/>
+                              </m:rPr>
+                              <m:t>,</m:t>
+                            </m:r>
+                            <m:sSub>
+                              <m:e>
+                                <m:r>
+                                  <m:t>n</m:t>
+                                </m:r>
+                              </m:e>
+                              <m:sub>
+                                <m:r>
+                                  <m:t>0</m:t>
+                                </m:r>
+                              </m:sub>
+                            </m:sSub>
+                            <m:r>
+                              <m:rPr>
+                                <m:nor/>
+                                <m:sty m:val="p"/>
+                              </m:rPr>
+                              <m:t>such that</m:t>
+                            </m:r>
+                          </m:e>
+                        </m:mr>
+                        <m:mr>
+                          <m:e/>
+                          <m:e>
+                            <m:r>
+                              <m:t>0</m:t>
+                            </m:r>
+                            <m:r>
+                              <m:rPr>
+                                <m:sty m:val="p"/>
+                              </m:rPr>
+                              <m:t>≤</m:t>
+                            </m:r>
+                            <m:sSub>
+                              <m:e>
+                                <m:r>
+                                  <m:t>c</m:t>
+                                </m:r>
+                              </m:e>
+                              <m:sub>
+                                <m:r>
+                                  <m:t>1</m:t>
+                                </m:r>
+                              </m:sub>
+                            </m:sSub>
+                            <m:r>
+                              <m:t>g</m:t>
+                            </m:r>
+                            <m:d>
+                              <m:dPr>
+                                <m:begChr m:val="("/>
+                                <m:endChr m:val=")"/>
+                                <m:sepChr m:val=""/>
+                                <m:grow/>
+                              </m:dPr>
+                              <m:e>
+                                <m:r>
+                                  <m:t>n</m:t>
+                                </m:r>
+                              </m:e>
+                            </m:d>
+                            <m:r>
+                              <m:rPr>
+                                <m:sty m:val="p"/>
+                              </m:rPr>
+                              <m:t>≤</m:t>
+                            </m:r>
+                            <m:r>
+                              <m:t>f</m:t>
+                            </m:r>
+                            <m:d>
+                              <m:dPr>
+                                <m:begChr m:val="("/>
+                                <m:endChr m:val=")"/>
+                                <m:sepChr m:val=""/>
+                                <m:grow/>
+                              </m:dPr>
+                              <m:e>
+                                <m:r>
+                                  <m:t>n</m:t>
+                                </m:r>
+                              </m:e>
+                            </m:d>
+                            <m:r>
+                              <m:rPr>
+                                <m:sty m:val="p"/>
+                              </m:rPr>
+                              <m:t>≤</m:t>
+                            </m:r>
+                            <m:sSub>
+                              <m:e>
+                                <m:r>
+                                  <m:t>c</m:t>
+                                </m:r>
+                              </m:e>
+                              <m:sub>
+                                <m:r>
+                                  <m:t>2</m:t>
+                                </m:r>
+                              </m:sub>
+                            </m:sSub>
+                            <m:r>
+                              <m:t>g</m:t>
+                            </m:r>
+                            <m:d>
+                              <m:dPr>
+                                <m:begChr m:val="("/>
+                                <m:endChr m:val=")"/>
+                                <m:sepChr m:val=""/>
+                                <m:grow/>
+                              </m:dPr>
+                              <m:e>
+                                <m:r>
+                                  <m:t>n</m:t>
+                                </m:r>
+                              </m:e>
+                            </m:d>
+                            <m:r>
+                              <m:rPr>
+                                <m:sty m:val="p"/>
+                              </m:rPr>
+                              <m:t>,</m:t>
+                            </m:r>
+                            <m:r>
+                              <m:rPr>
+                                <m:sty m:val="p"/>
+                              </m:rPr>
+                              <m:t>∀</m:t>
+                            </m:r>
+                            <m:r>
                               <m:t>n</m:t>
                             </m:r>
+                            <m:r>
+                              <m:rPr>
+                                <m:sty m:val="p"/>
+                              </m:rPr>
+                              <m:t>≥</m:t>
+                            </m:r>
+                            <m:sSub>
+                              <m:e>
+                                <m:r>
+                                  <m:t>n</m:t>
+                                </m:r>
+                              </m:e>
+                              <m:sub>
+                                <m:r>
+                                  <m:t>0</m:t>
+                                </m:r>
+                              </m:sub>
+                            </m:sSub>
                           </m:e>
-                        </m:d>
-                      </m:e>
-                    </m:d>
-                  </m:oMath>
-                </a14:m>
-                <a:r>
-                  <a:rPr/>
-                  <a:t> if </a:t>
-                </a:r>
-                <a14:m>
-                  <m:oMath xmlns:m="http://schemas.openxmlformats.org/officeDocument/2006/math">
-                    <m:r>
-                      <m:rPr>
-                        <m:sty m:val="p"/>
-                      </m:rPr>
-                      <m:t>∃</m:t>
-                    </m:r>
-                  </m:oMath>
-                </a14:m>
-                <a:r>
-                  <a:rPr/>
-                  <a:t> positive constants </a:t>
-                </a:r>
-                <a14:m>
-                  <m:oMath xmlns:m="http://schemas.openxmlformats.org/officeDocument/2006/math">
-                    <m:sSub>
-                      <m:e>
-                        <m:r>
-                          <m:t>c</m:t>
-                        </m:r>
-                      </m:e>
-                      <m:sub>
-                        <m:r>
-                          <m:t>1</m:t>
-                        </m:r>
-                      </m:sub>
-                    </m:sSub>
-                    <m:r>
-                      <m:rPr>
-                        <m:sty m:val="p"/>
-                      </m:rPr>
-                      <m:t>,</m:t>
-                    </m:r>
-                    <m:sSub>
-                      <m:e>
-                        <m:r>
-                          <m:t>c</m:t>
-                        </m:r>
-                      </m:e>
-                      <m:sub>
-                        <m:r>
-                          <m:t>2</m:t>
-                        </m:r>
-                      </m:sub>
-                    </m:sSub>
-                    <m:r>
-                      <m:rPr>
-                        <m:sty m:val="p"/>
-                      </m:rPr>
-                      <m:t>,</m:t>
-                    </m:r>
-                    <m:sSub>
-                      <m:e>
-                        <m:r>
-                          <m:t>n</m:t>
-                        </m:r>
-                      </m:e>
-                      <m:sub>
-                        <m:r>
-                          <m:t>0</m:t>
-                        </m:r>
-                      </m:sub>
-                    </m:sSub>
-                  </m:oMath>
-                </a14:m>
-                <a:r>
-                  <a:rPr/>
-                  <a:t> such that </a:t>
-                </a:r>
-                <a14:m>
-                  <m:oMath xmlns:m="http://schemas.openxmlformats.org/officeDocument/2006/math">
-                    <m:r>
-                      <m:t>0</m:t>
-                    </m:r>
-                    <m:r>
-                      <m:rPr>
-                        <m:sty m:val="p"/>
-                      </m:rPr>
-                      <m:t>≤</m:t>
-                    </m:r>
-                    <m:sSub>
-                      <m:e>
-                        <m:r>
-                          <m:t>c</m:t>
-                        </m:r>
-                      </m:e>
-                      <m:sub>
-                        <m:r>
-                          <m:t>1</m:t>
-                        </m:r>
-                      </m:sub>
-                    </m:sSub>
-                    <m:r>
-                      <m:t>g</m:t>
-                    </m:r>
-                    <m:d>
-                      <m:dPr>
-                        <m:begChr m:val="("/>
-                        <m:endChr m:val=")"/>
-                        <m:sepChr m:val=""/>
-                        <m:grow/>
-                      </m:dPr>
-                      <m:e>
-                        <m:r>
-                          <m:t>n</m:t>
-                        </m:r>
-                      </m:e>
-                    </m:d>
-                    <m:r>
-                      <m:rPr>
-                        <m:sty m:val="p"/>
-                      </m:rPr>
-                      <m:t>≤</m:t>
-                    </m:r>
-                    <m:r>
-                      <m:t>f</m:t>
-                    </m:r>
-                    <m:d>
-                      <m:dPr>
-                        <m:begChr m:val="("/>
-                        <m:endChr m:val=")"/>
-                        <m:sepChr m:val=""/>
-                        <m:grow/>
-                      </m:dPr>
-                      <m:e>
-                        <m:r>
-                          <m:t>n</m:t>
-                        </m:r>
-                      </m:e>
-                    </m:d>
-                    <m:r>
-                      <m:rPr>
-                        <m:sty m:val="p"/>
-                      </m:rPr>
-                      <m:t>≤</m:t>
-                    </m:r>
-                    <m:sSub>
-                      <m:e>
-                        <m:r>
-                          <m:t>c</m:t>
-                        </m:r>
-                      </m:e>
-                      <m:sub>
-                        <m:r>
-                          <m:t>2</m:t>
-                        </m:r>
-                      </m:sub>
-                    </m:sSub>
-                    <m:r>
-                      <m:t>g</m:t>
-                    </m:r>
-                    <m:d>
-                      <m:dPr>
-                        <m:begChr m:val="("/>
-                        <m:endChr m:val=")"/>
-                        <m:sepChr m:val=""/>
-                        <m:grow/>
-                      </m:dPr>
-                      <m:e>
-                        <m:r>
-                          <m:t>n</m:t>
-                        </m:r>
-                      </m:e>
-                    </m:d>
-                    <m:r>
-                      <m:rPr>
-                        <m:sty m:val="p"/>
-                      </m:rPr>
-                      <m:t>,</m:t>
-                    </m:r>
-                    <m:r>
-                      <m:rPr>
-                        <m:sty m:val="p"/>
-                      </m:rPr>
-                      <m:t>∀</m:t>
-                    </m:r>
-                    <m:r>
-                      <m:t>n</m:t>
-                    </m:r>
-                    <m:r>
-                      <m:rPr>
-                        <m:sty m:val="p"/>
-                      </m:rPr>
-                      <m:t>≥</m:t>
-                    </m:r>
-                    <m:sSub>
-                      <m:e>
-                        <m:r>
-                          <m:t>n</m:t>
-                        </m:r>
-                      </m:e>
-                      <m:sub>
-                        <m:r>
-                          <m:t>0</m:t>
-                        </m:r>
-                      </m:sub>
-                    </m:sSub>
-                  </m:oMath>
+                        </m:mr>
+                      </m:m>
+                    </m:oMath>
+                  </m:oMathPara>
                 </a14:m>
               </a:p>
             </p:txBody>
@@ -8977,199 +9052,230 @@
                       <m:jc m:val="center"/>
                     </m:oMathParaPr>
                     <m:oMath>
-                      <m:r>
-                        <m:t>O</m:t>
-                      </m:r>
-                      <m:d>
-                        <m:dPr>
-                          <m:begChr m:val="("/>
-                          <m:endChr m:val=")"/>
-                          <m:sepChr m:val=""/>
-                          <m:grow/>
-                        </m:dPr>
-                        <m:e>
-                          <m:r>
-                            <m:t>g</m:t>
-                          </m:r>
-                          <m:d>
-                            <m:dPr>
-                              <m:begChr m:val="("/>
-                              <m:endChr m:val=")"/>
-                              <m:sepChr m:val=""/>
-                              <m:grow/>
-                            </m:dPr>
-                            <m:e>
-                              <m:r>
-                                <m:t>n</m:t>
-                              </m:r>
-                            </m:e>
-                          </m:d>
-                        </m:e>
-                      </m:d>
-                      <m:r>
-                        <m:rPr>
-                          <m:sty m:val="p"/>
-                        </m:rPr>
-                        <m:t>=</m:t>
-                      </m:r>
-                      <m:r>
-                        <m:rPr>
-                          <m:sty m:val="p"/>
-                        </m:rPr>
-                        <m:t>{</m:t>
-                      </m:r>
-                      <m:r>
-                        <m:t>f</m:t>
-                      </m:r>
-                      <m:d>
-                        <m:dPr>
-                          <m:begChr m:val="("/>
-                          <m:endChr m:val=")"/>
-                          <m:sepChr m:val=""/>
-                          <m:grow/>
-                        </m:dPr>
-                        <m:e>
-                          <m:r>
-                            <m:t>n</m:t>
-                          </m:r>
-                        </m:e>
-                      </m:d>
-                      <m:r>
-                        <m:rPr>
-                          <m:sty m:val="p"/>
-                        </m:rPr>
-                        <m:t>:</m:t>
-                      </m:r>
-                      <m:r>
-                        <m:rPr>
-                          <m:sty m:val="p"/>
-                        </m:rPr>
-                        <m:t>∃</m:t>
-                      </m:r>
-                      <m:r>
-                        <m:rPr>
-                          <m:nor/>
-                          <m:sty m:val="p"/>
-                        </m:rPr>
-                        <m:t> positive constant </m:t>
-                      </m:r>
-                      <m:r>
-                        <m:t>c</m:t>
-                      </m:r>
-                      <m:r>
-                        <m:rPr>
-                          <m:sty m:val="p"/>
-                        </m:rPr>
-                        <m:t>,</m:t>
-                      </m:r>
-                      <m:sSub>
-                        <m:e>
-                          <m:r>
-                            <m:t>n</m:t>
-                          </m:r>
-                        </m:e>
-                        <m:sub>
-                          <m:r>
-                            <m:t>0</m:t>
-                          </m:r>
-                        </m:sub>
-                      </m:sSub>
-                      <m:r>
-                        <m:rPr>
-                          <m:nor/>
-                          <m:sty m:val="p"/>
-                        </m:rPr>
-                        <m:t> such that </m:t>
-                      </m:r>
-                      <m:r>
-                        <m:t>0</m:t>
-                      </m:r>
-                      <m:r>
-                        <m:rPr>
-                          <m:sty m:val="p"/>
-                        </m:rPr>
-                        <m:t>≤</m:t>
-                      </m:r>
-                      <m:r>
-                        <m:t>f</m:t>
-                      </m:r>
-                      <m:d>
-                        <m:dPr>
-                          <m:begChr m:val="("/>
-                          <m:endChr m:val=")"/>
-                          <m:sepChr m:val=""/>
-                          <m:grow/>
-                        </m:dPr>
-                        <m:e>
-                          <m:r>
-                            <m:t>n</m:t>
-                          </m:r>
-                        </m:e>
-                      </m:d>
-                      <m:r>
-                        <m:rPr>
-                          <m:sty m:val="p"/>
-                        </m:rPr>
-                        <m:t>≤</m:t>
-                      </m:r>
-                      <m:r>
-                        <m:t>c</m:t>
-                      </m:r>
-                      <m:r>
-                        <m:t>g</m:t>
-                      </m:r>
-                      <m:d>
-                        <m:dPr>
-                          <m:begChr m:val="("/>
-                          <m:endChr m:val=")"/>
-                          <m:sepChr m:val=""/>
-                          <m:grow/>
-                        </m:dPr>
-                        <m:e>
-                          <m:r>
-                            <m:t>n</m:t>
-                          </m:r>
-                        </m:e>
-                      </m:d>
-                      <m:r>
-                        <m:rPr>
-                          <m:sty m:val="p"/>
-                        </m:rPr>
-                        <m:t>,</m:t>
-                      </m:r>
-                      <m:r>
-                        <m:rPr>
-                          <m:sty m:val="p"/>
-                        </m:rPr>
-                        <m:t>∀</m:t>
-                      </m:r>
-                      <m:r>
-                        <m:t>n</m:t>
-                      </m:r>
-                      <m:r>
-                        <m:rPr>
-                          <m:sty m:val="p"/>
-                        </m:rPr>
-                        <m:t>≥</m:t>
-                      </m:r>
-                      <m:sSub>
-                        <m:e>
-                          <m:r>
-                            <m:t>n</m:t>
-                          </m:r>
-                        </m:e>
-                        <m:sub>
-                          <m:r>
-                            <m:t>0</m:t>
-                          </m:r>
-                        </m:sub>
-                      </m:sSub>
-                      <m:r>
-                        <m:rPr>
-                          <m:sty m:val="p"/>
-                        </m:rPr>
-                        <m:t>}</m:t>
-                      </m:r>
+                      <m:m>
+                        <m:mPr>
+                          <m:baseJc m:val="center"/>
+                          <m:plcHide m:val="1"/>
+                          <m:mcs>
+                            <m:mc>
+                              <m:mcPr>
+                                <m:mcJc m:val="right"/>
+                                <m:count m:val="1"/>
+                              </m:mcPr>
+                            </m:mc>
+                            <m:mc>
+                              <m:mcPr>
+                                <m:mcJc m:val="left"/>
+                                <m:count m:val="1"/>
+                              </m:mcPr>
+                            </m:mc>
+                          </m:mcs>
+                        </m:mPr>
+                        <m:mr>
+                          <m:e>
+                            <m:r>
+                              <m:t>O</m:t>
+                            </m:r>
+                            <m:d>
+                              <m:dPr>
+                                <m:begChr m:val="("/>
+                                <m:endChr m:val=")"/>
+                                <m:sepChr m:val=""/>
+                                <m:grow/>
+                              </m:dPr>
+                              <m:e>
+                                <m:r>
+                                  <m:t>g</m:t>
+                                </m:r>
+                                <m:d>
+                                  <m:dPr>
+                                    <m:begChr m:val="("/>
+                                    <m:endChr m:val=")"/>
+                                    <m:sepChr m:val=""/>
+                                    <m:grow/>
+                                  </m:dPr>
+                                  <m:e>
+                                    <m:r>
+                                      <m:t>n</m:t>
+                                    </m:r>
+                                  </m:e>
+                                </m:d>
+                              </m:e>
+                            </m:d>
+                          </m:e>
+                          <m:e>
+                            <m:r>
+                              <m:rPr>
+                                <m:sty m:val="p"/>
+                              </m:rPr>
+                              <m:t>=</m:t>
+                            </m:r>
+                            <m:r>
+                              <m:rPr>
+                                <m:sty m:val="p"/>
+                              </m:rPr>
+                              <m:t>{</m:t>
+                            </m:r>
+                            <m:r>
+                              <m:t>f</m:t>
+                            </m:r>
+                            <m:d>
+                              <m:dPr>
+                                <m:begChr m:val="("/>
+                                <m:endChr m:val=")"/>
+                                <m:sepChr m:val=""/>
+                                <m:grow/>
+                              </m:dPr>
+                              <m:e>
+                                <m:r>
+                                  <m:t>n</m:t>
+                                </m:r>
+                              </m:e>
+                            </m:d>
+                            <m:r>
+                              <m:rPr>
+                                <m:sty m:val="p"/>
+                              </m:rPr>
+                              <m:t>:</m:t>
+                            </m:r>
+                            <m:r>
+                              <m:rPr>
+                                <m:sty m:val="p"/>
+                              </m:rPr>
+                              <m:t>∃</m:t>
+                            </m:r>
+                            <m:r>
+                              <m:rPr>
+                                <m:nor/>
+                                <m:sty m:val="p"/>
+                              </m:rPr>
+                              <m:t> positive constant </m:t>
+                            </m:r>
+                            <m:r>
+                              <m:t>c</m:t>
+                            </m:r>
+                            <m:r>
+                              <m:rPr>
+                                <m:sty m:val="p"/>
+                              </m:rPr>
+                              <m:t>,</m:t>
+                            </m:r>
+                            <m:sSub>
+                              <m:e>
+                                <m:r>
+                                  <m:t>n</m:t>
+                                </m:r>
+                              </m:e>
+                              <m:sub>
+                                <m:r>
+                                  <m:t>0</m:t>
+                                </m:r>
+                              </m:sub>
+                            </m:sSub>
+                            <m:r>
+                              <m:rPr>
+                                <m:nor/>
+                                <m:sty m:val="p"/>
+                              </m:rPr>
+                              <m:t> such that </m:t>
+                            </m:r>
+                          </m:e>
+                        </m:mr>
+                        <m:mr>
+                          <m:e/>
+                          <m:e>
+                            <m:r>
+                              <m:t>0</m:t>
+                            </m:r>
+                            <m:r>
+                              <m:rPr>
+                                <m:sty m:val="p"/>
+                              </m:rPr>
+                              <m:t>≤</m:t>
+                            </m:r>
+                            <m:r>
+                              <m:t>f</m:t>
+                            </m:r>
+                            <m:d>
+                              <m:dPr>
+                                <m:begChr m:val="("/>
+                                <m:endChr m:val=")"/>
+                                <m:sepChr m:val=""/>
+                                <m:grow/>
+                              </m:dPr>
+                              <m:e>
+                                <m:r>
+                                  <m:t>n</m:t>
+                                </m:r>
+                              </m:e>
+                            </m:d>
+                            <m:r>
+                              <m:rPr>
+                                <m:sty m:val="p"/>
+                              </m:rPr>
+                              <m:t>≤</m:t>
+                            </m:r>
+                            <m:r>
+                              <m:t>c</m:t>
+                            </m:r>
+                            <m:r>
+                              <m:t>g</m:t>
+                            </m:r>
+                            <m:d>
+                              <m:dPr>
+                                <m:begChr m:val="("/>
+                                <m:endChr m:val=")"/>
+                                <m:sepChr m:val=""/>
+                                <m:grow/>
+                              </m:dPr>
+                              <m:e>
+                                <m:r>
+                                  <m:t>n</m:t>
+                                </m:r>
+                              </m:e>
+                            </m:d>
+                            <m:r>
+                              <m:rPr>
+                                <m:sty m:val="p"/>
+                              </m:rPr>
+                              <m:t>,</m:t>
+                            </m:r>
+                            <m:r>
+                              <m:rPr>
+                                <m:sty m:val="p"/>
+                              </m:rPr>
+                              <m:t>∀</m:t>
+                            </m:r>
+                            <m:r>
+                              <m:t>n</m:t>
+                            </m:r>
+                            <m:r>
+                              <m:rPr>
+                                <m:sty m:val="p"/>
+                              </m:rPr>
+                              <m:t>≥</m:t>
+                            </m:r>
+                            <m:sSub>
+                              <m:e>
+                                <m:r>
+                                  <m:t>n</m:t>
+                                </m:r>
+                              </m:e>
+                              <m:sub>
+                                <m:r>
+                                  <m:t>0</m:t>
+                                </m:r>
+                              </m:sub>
+                            </m:sSub>
+                            <m:r>
+                              <m:rPr>
+                                <m:sty m:val="p"/>
+                              </m:rPr>
+                              <m:t>}</m:t>
+                            </m:r>
+                          </m:e>
+                        </m:mr>
+                      </m:m>
                     </m:oMath>
                   </m:oMathPara>
                 </a14:m>
@@ -16929,7 +17035,7 @@
             </a:pPr>
             <a:r>
               <a:rPr/>
-              <a:t>References (TODO: Update Missing References)</a:t>
+              <a:t>References</a:t>
             </a:r>
           </a:p>
         </p:txBody>

</xml_diff>